<commit_message>
update debug log & detect status
</commit_message>
<xml_diff>
--- a/Hack_Korea/Presentation1.pptx
+++ b/Hack_Korea/Presentation1.pptx
@@ -7,7 +7,8 @@
   <p:sldIdLst>
     <p:sldId id="256" r:id="rId2"/>
     <p:sldId id="257" r:id="rId3"/>
-    <p:sldId id="261" r:id="rId4"/>
+    <p:sldId id="262" r:id="rId4"/>
+    <p:sldId id="261" r:id="rId5"/>
   </p:sldIdLst>
   <p:sldSz cx="12192000" cy="6858000"/>
   <p:notesSz cx="6858000" cy="9144000"/>
@@ -106,6 +107,11 @@
       </a:defRPr>
     </a:lvl9pPr>
   </p:defaultTextStyle>
+  <p:extLst>
+    <p:ext uri="{EFAFB233-063F-42B5-8137-9DF3F51BA10A}">
+      <p15:sldGuideLst xmlns:p15="http://schemas.microsoft.com/office/powerpoint/2012/main"/>
+    </p:ext>
+  </p:extLst>
 </p:presentation>
 </file>
 
@@ -3417,12 +3423,22 @@
         </p:nvSpPr>
         <p:spPr>
           <a:xfrm>
-            <a:off x="2668657" y="1063487"/>
+            <a:off x="3791779" y="1759226"/>
             <a:ext cx="1858618" cy="1123122"/>
           </a:xfrm>
           <a:prstGeom prst="rect">
             <a:avLst/>
           </a:prstGeom>
+          <a:solidFill>
+            <a:schemeClr val="bg2">
+              <a:lumMod val="75000"/>
+            </a:schemeClr>
+          </a:solidFill>
+          <a:ln>
+            <a:solidFill>
+              <a:schemeClr val="tx1"/>
+            </a:solidFill>
+          </a:ln>
         </p:spPr>
         <p:style>
           <a:lnRef idx="2">
@@ -3466,12 +3482,20 @@
         </p:nvSpPr>
         <p:spPr>
           <a:xfrm>
-            <a:off x="2668657" y="3313043"/>
+            <a:off x="3791779" y="4008782"/>
             <a:ext cx="1858618" cy="1123122"/>
           </a:xfrm>
           <a:prstGeom prst="rect">
             <a:avLst/>
           </a:prstGeom>
+          <a:solidFill>
+            <a:srgbClr val="002060"/>
+          </a:solidFill>
+          <a:ln>
+            <a:solidFill>
+              <a:schemeClr val="tx1"/>
+            </a:solidFill>
+          </a:ln>
         </p:spPr>
         <p:style>
           <a:lnRef idx="2">
@@ -3515,12 +3539,22 @@
         </p:nvSpPr>
         <p:spPr>
           <a:xfrm>
-            <a:off x="5721626" y="1063487"/>
+            <a:off x="6844748" y="1759226"/>
             <a:ext cx="1858618" cy="1123122"/>
           </a:xfrm>
           <a:prstGeom prst="rect">
             <a:avLst/>
           </a:prstGeom>
+          <a:solidFill>
+            <a:schemeClr val="bg2">
+              <a:lumMod val="50000"/>
+            </a:schemeClr>
+          </a:solidFill>
+          <a:ln>
+            <a:solidFill>
+              <a:schemeClr val="tx1"/>
+            </a:solidFill>
+          </a:ln>
         </p:spPr>
         <p:style>
           <a:lnRef idx="2">
@@ -3566,13 +3600,16 @@
         </p:nvCxnSpPr>
         <p:spPr>
           <a:xfrm flipH="1">
-            <a:off x="4527275" y="1427340"/>
+            <a:off x="5650397" y="2202592"/>
             <a:ext cx="1194351" cy="0"/>
           </a:xfrm>
           <a:prstGeom prst="straightConnector1">
             <a:avLst/>
           </a:prstGeom>
           <a:ln w="47625">
+            <a:solidFill>
+              <a:schemeClr val="tx1"/>
+            </a:solidFill>
             <a:tailEnd type="triangle"/>
           </a:ln>
         </p:spPr>
@@ -3607,13 +3644,16 @@
         </p:nvCxnSpPr>
         <p:spPr>
           <a:xfrm>
-            <a:off x="3359357" y="2186609"/>
+            <a:off x="4582512" y="2882348"/>
             <a:ext cx="14060" cy="1126433"/>
           </a:xfrm>
           <a:prstGeom prst="straightConnector1">
             <a:avLst/>
           </a:prstGeom>
           <a:ln w="47625">
+            <a:solidFill>
+              <a:schemeClr val="tx1"/>
+            </a:solidFill>
             <a:tailEnd type="triangle"/>
           </a:ln>
         </p:spPr>
@@ -3646,12 +3686,17 @@
         </p:nvSpPr>
         <p:spPr>
           <a:xfrm>
-            <a:off x="6285169" y="2481943"/>
+            <a:off x="7408291" y="3177682"/>
             <a:ext cx="731531" cy="731531"/>
           </a:xfrm>
           <a:prstGeom prst="ellipse">
             <a:avLst/>
           </a:prstGeom>
+          <a:solidFill>
+            <a:schemeClr val="accent1">
+              <a:lumMod val="75000"/>
+            </a:schemeClr>
+          </a:solidFill>
         </p:spPr>
         <p:style>
           <a:lnRef idx="2">
@@ -3700,13 +3745,19 @@
         </p:nvCxnSpPr>
         <p:spPr>
           <a:xfrm>
-            <a:off x="6650935" y="2186609"/>
+            <a:off x="7774057" y="2882348"/>
             <a:ext cx="0" cy="295334"/>
           </a:xfrm>
           <a:prstGeom prst="line">
             <a:avLst/>
           </a:prstGeom>
-          <a:ln w="47625"/>
+          <a:ln w="47625">
+            <a:solidFill>
+              <a:schemeClr val="bg2">
+                <a:lumMod val="50000"/>
+              </a:schemeClr>
+            </a:solidFill>
+          </a:ln>
         </p:spPr>
         <p:style>
           <a:lnRef idx="1">
@@ -3739,13 +3790,16 @@
         </p:nvCxnSpPr>
         <p:spPr>
           <a:xfrm flipV="1">
-            <a:off x="3845101" y="2186609"/>
+            <a:off x="4839014" y="2882348"/>
             <a:ext cx="0" cy="1126434"/>
           </a:xfrm>
           <a:prstGeom prst="straightConnector1">
             <a:avLst/>
           </a:prstGeom>
           <a:ln w="47625">
+            <a:solidFill>
+              <a:schemeClr val="tx1"/>
+            </a:solidFill>
             <a:tailEnd type="triangle"/>
           </a:ln>
         </p:spPr>
@@ -3780,13 +3834,16 @@
         </p:nvCxnSpPr>
         <p:spPr>
           <a:xfrm>
-            <a:off x="4527275" y="1835113"/>
+            <a:off x="5650397" y="2431460"/>
             <a:ext cx="1194351" cy="0"/>
           </a:xfrm>
           <a:prstGeom prst="straightConnector1">
             <a:avLst/>
           </a:prstGeom>
           <a:ln w="47625">
+            <a:solidFill>
+              <a:schemeClr val="tx1"/>
+            </a:solidFill>
             <a:tailEnd type="triangle"/>
           </a:ln>
         </p:spPr>
@@ -3805,6 +3862,41 @@
           </a:fontRef>
         </p:style>
       </p:cxnSp>
+      <p:sp>
+        <p:nvSpPr>
+          <p:cNvPr id="2" name="TextBox 1">
+            <a:extLst>
+              <a:ext uri="{FF2B5EF4-FFF2-40B4-BE49-F238E27FC236}">
+                <a16:creationId xmlns:a16="http://schemas.microsoft.com/office/drawing/2014/main" id="{887C7C50-6095-A946-A013-127BB318C1B1}"/>
+              </a:ext>
+            </a:extLst>
+          </p:cNvPr>
+          <p:cNvSpPr txBox="1"/>
+          <p:nvPr/>
+        </p:nvSpPr>
+        <p:spPr>
+          <a:xfrm>
+            <a:off x="1162879" y="632792"/>
+            <a:ext cx="2912165" cy="461665"/>
+          </a:xfrm>
+          <a:prstGeom prst="rect">
+            <a:avLst/>
+          </a:prstGeom>
+          <a:noFill/>
+        </p:spPr>
+        <p:txBody>
+          <a:bodyPr wrap="square" rtlCol="0">
+            <a:spAutoFit/>
+          </a:bodyPr>
+          <a:lstStyle/>
+          <a:p>
+            <a:r>
+              <a:rPr lang="en-US" sz="2400" dirty="0"/>
+              <a:t>Thunder2 Data Flow</a:t>
+            </a:r>
+          </a:p>
+        </p:txBody>
+      </p:sp>
     </p:spTree>
     <p:extLst>
       <p:ext uri="{BB962C8B-B14F-4D97-AF65-F5344CB8AC3E}">
@@ -3819,6 +3911,628 @@
 </file>
 
 <file path=ppt/slides/slide3.xml><?xml version="1.0" encoding="utf-8"?>
+<p:sld xmlns:a="http://schemas.openxmlformats.org/drawingml/2006/main" xmlns:r="http://schemas.openxmlformats.org/officeDocument/2006/relationships" xmlns:p="http://schemas.openxmlformats.org/presentationml/2006/main">
+  <p:cSld>
+    <p:spTree>
+      <p:nvGrpSpPr>
+        <p:cNvPr id="1" name=""/>
+        <p:cNvGrpSpPr/>
+        <p:nvPr/>
+      </p:nvGrpSpPr>
+      <p:grpSpPr>
+        <a:xfrm>
+          <a:off x="0" y="0"/>
+          <a:ext cx="0" cy="0"/>
+          <a:chOff x="0" y="0"/>
+          <a:chExt cx="0" cy="0"/>
+        </a:xfrm>
+      </p:grpSpPr>
+      <p:sp>
+        <p:nvSpPr>
+          <p:cNvPr id="5" name="Rectangle 4">
+            <a:extLst>
+              <a:ext uri="{FF2B5EF4-FFF2-40B4-BE49-F238E27FC236}">
+                <a16:creationId xmlns:a16="http://schemas.microsoft.com/office/drawing/2014/main" id="{46C73407-8F87-2946-A741-3723E53C7773}"/>
+              </a:ext>
+            </a:extLst>
+          </p:cNvPr>
+          <p:cNvSpPr/>
+          <p:nvPr/>
+        </p:nvSpPr>
+        <p:spPr>
+          <a:xfrm>
+            <a:off x="2221399" y="1769163"/>
+            <a:ext cx="1858618" cy="1123122"/>
+          </a:xfrm>
+          <a:prstGeom prst="rect">
+            <a:avLst/>
+          </a:prstGeom>
+          <a:solidFill>
+            <a:schemeClr val="bg2">
+              <a:lumMod val="75000"/>
+            </a:schemeClr>
+          </a:solidFill>
+          <a:ln>
+            <a:solidFill>
+              <a:schemeClr val="tx1"/>
+            </a:solidFill>
+          </a:ln>
+        </p:spPr>
+        <p:style>
+          <a:lnRef idx="2">
+            <a:schemeClr val="accent1">
+              <a:shade val="50000"/>
+            </a:schemeClr>
+          </a:lnRef>
+          <a:fillRef idx="1">
+            <a:schemeClr val="accent1"/>
+          </a:fillRef>
+          <a:effectRef idx="0">
+            <a:schemeClr val="accent1"/>
+          </a:effectRef>
+          <a:fontRef idx="minor">
+            <a:schemeClr val="lt1"/>
+          </a:fontRef>
+        </p:style>
+        <p:txBody>
+          <a:bodyPr rtlCol="0" anchor="ctr"/>
+          <a:lstStyle/>
+          <a:p>
+            <a:pPr algn="ctr"/>
+            <a:r>
+              <a:rPr lang="en-US" dirty="0"/>
+              <a:t>Cloud Server</a:t>
+            </a:r>
+          </a:p>
+        </p:txBody>
+      </p:sp>
+      <p:sp>
+        <p:nvSpPr>
+          <p:cNvPr id="6" name="Rectangle 5">
+            <a:extLst>
+              <a:ext uri="{FF2B5EF4-FFF2-40B4-BE49-F238E27FC236}">
+                <a16:creationId xmlns:a16="http://schemas.microsoft.com/office/drawing/2014/main" id="{EBDE8269-929E-8B42-953C-58BE5D063440}"/>
+              </a:ext>
+            </a:extLst>
+          </p:cNvPr>
+          <p:cNvSpPr/>
+          <p:nvPr/>
+        </p:nvSpPr>
+        <p:spPr>
+          <a:xfrm>
+            <a:off x="2221399" y="4018719"/>
+            <a:ext cx="1858618" cy="1123122"/>
+          </a:xfrm>
+          <a:prstGeom prst="rect">
+            <a:avLst/>
+          </a:prstGeom>
+          <a:solidFill>
+            <a:srgbClr val="002060"/>
+          </a:solidFill>
+          <a:ln>
+            <a:solidFill>
+              <a:schemeClr val="tx1"/>
+            </a:solidFill>
+          </a:ln>
+        </p:spPr>
+        <p:style>
+          <a:lnRef idx="2">
+            <a:schemeClr val="accent1">
+              <a:shade val="50000"/>
+            </a:schemeClr>
+          </a:lnRef>
+          <a:fillRef idx="1">
+            <a:schemeClr val="accent1"/>
+          </a:fillRef>
+          <a:effectRef idx="0">
+            <a:schemeClr val="accent1"/>
+          </a:effectRef>
+          <a:fontRef idx="minor">
+            <a:schemeClr val="lt1"/>
+          </a:fontRef>
+        </p:style>
+        <p:txBody>
+          <a:bodyPr rtlCol="0" anchor="ctr"/>
+          <a:lstStyle/>
+          <a:p>
+            <a:pPr algn="ctr"/>
+            <a:r>
+              <a:rPr lang="en-US" dirty="0"/>
+              <a:t>EG Kit App</a:t>
+            </a:r>
+          </a:p>
+        </p:txBody>
+      </p:sp>
+      <p:sp>
+        <p:nvSpPr>
+          <p:cNvPr id="7" name="Rectangle 6">
+            <a:extLst>
+              <a:ext uri="{FF2B5EF4-FFF2-40B4-BE49-F238E27FC236}">
+                <a16:creationId xmlns:a16="http://schemas.microsoft.com/office/drawing/2014/main" id="{3954B740-B038-804F-8E95-79CF6061AD07}"/>
+              </a:ext>
+            </a:extLst>
+          </p:cNvPr>
+          <p:cNvSpPr/>
+          <p:nvPr/>
+        </p:nvSpPr>
+        <p:spPr>
+          <a:xfrm>
+            <a:off x="5274368" y="1769163"/>
+            <a:ext cx="1858618" cy="1123122"/>
+          </a:xfrm>
+          <a:prstGeom prst="rect">
+            <a:avLst/>
+          </a:prstGeom>
+          <a:solidFill>
+            <a:schemeClr val="bg2">
+              <a:lumMod val="50000"/>
+            </a:schemeClr>
+          </a:solidFill>
+          <a:ln>
+            <a:solidFill>
+              <a:schemeClr val="tx1"/>
+            </a:solidFill>
+          </a:ln>
+        </p:spPr>
+        <p:style>
+          <a:lnRef idx="2">
+            <a:schemeClr val="accent1">
+              <a:shade val="50000"/>
+            </a:schemeClr>
+          </a:lnRef>
+          <a:fillRef idx="1">
+            <a:schemeClr val="accent1"/>
+          </a:fillRef>
+          <a:effectRef idx="0">
+            <a:schemeClr val="accent1"/>
+          </a:effectRef>
+          <a:fontRef idx="minor">
+            <a:schemeClr val="lt1"/>
+          </a:fontRef>
+        </p:style>
+        <p:txBody>
+          <a:bodyPr rtlCol="0" anchor="ctr"/>
+          <a:lstStyle/>
+          <a:p>
+            <a:pPr algn="ctr"/>
+            <a:r>
+              <a:rPr lang="en-US" dirty="0"/>
+              <a:t>Thunder</a:t>
+            </a:r>
+          </a:p>
+        </p:txBody>
+      </p:sp>
+      <p:cxnSp>
+        <p:nvCxnSpPr>
+          <p:cNvPr id="9" name="Straight Arrow Connector 8">
+            <a:extLst>
+              <a:ext uri="{FF2B5EF4-FFF2-40B4-BE49-F238E27FC236}">
+                <a16:creationId xmlns:a16="http://schemas.microsoft.com/office/drawing/2014/main" id="{9FF1232B-1053-A549-AD2A-563680BF19EF}"/>
+              </a:ext>
+            </a:extLst>
+          </p:cNvPr>
+          <p:cNvCxnSpPr>
+            <a:cxnSpLocks/>
+          </p:cNvCxnSpPr>
+          <p:nvPr/>
+        </p:nvCxnSpPr>
+        <p:spPr>
+          <a:xfrm flipH="1">
+            <a:off x="4080017" y="2212529"/>
+            <a:ext cx="1194351" cy="0"/>
+          </a:xfrm>
+          <a:prstGeom prst="straightConnector1">
+            <a:avLst/>
+          </a:prstGeom>
+          <a:ln w="47625">
+            <a:solidFill>
+              <a:schemeClr val="tx1"/>
+            </a:solidFill>
+            <a:tailEnd type="triangle"/>
+          </a:ln>
+        </p:spPr>
+        <p:style>
+          <a:lnRef idx="1">
+            <a:schemeClr val="accent1"/>
+          </a:lnRef>
+          <a:fillRef idx="0">
+            <a:schemeClr val="accent1"/>
+          </a:fillRef>
+          <a:effectRef idx="0">
+            <a:schemeClr val="accent1"/>
+          </a:effectRef>
+          <a:fontRef idx="minor">
+            <a:schemeClr val="tx1"/>
+          </a:fontRef>
+        </p:style>
+      </p:cxnSp>
+      <p:cxnSp>
+        <p:nvCxnSpPr>
+          <p:cNvPr id="10" name="Straight Arrow Connector 9">
+            <a:extLst>
+              <a:ext uri="{FF2B5EF4-FFF2-40B4-BE49-F238E27FC236}">
+                <a16:creationId xmlns:a16="http://schemas.microsoft.com/office/drawing/2014/main" id="{F02227A3-B688-D84D-815B-906B15B162D7}"/>
+              </a:ext>
+            </a:extLst>
+          </p:cNvPr>
+          <p:cNvCxnSpPr>
+            <a:cxnSpLocks/>
+          </p:cNvCxnSpPr>
+          <p:nvPr/>
+        </p:nvCxnSpPr>
+        <p:spPr>
+          <a:xfrm>
+            <a:off x="3012132" y="2892285"/>
+            <a:ext cx="14060" cy="1126433"/>
+          </a:xfrm>
+          <a:prstGeom prst="straightConnector1">
+            <a:avLst/>
+          </a:prstGeom>
+          <a:ln w="47625">
+            <a:solidFill>
+              <a:schemeClr val="tx1"/>
+            </a:solidFill>
+            <a:tailEnd type="triangle"/>
+          </a:ln>
+        </p:spPr>
+        <p:style>
+          <a:lnRef idx="1">
+            <a:schemeClr val="accent1"/>
+          </a:lnRef>
+          <a:fillRef idx="0">
+            <a:schemeClr val="accent1"/>
+          </a:fillRef>
+          <a:effectRef idx="0">
+            <a:schemeClr val="accent1"/>
+          </a:effectRef>
+          <a:fontRef idx="minor">
+            <a:schemeClr val="tx1"/>
+          </a:fontRef>
+        </p:style>
+      </p:cxnSp>
+      <p:sp>
+        <p:nvSpPr>
+          <p:cNvPr id="14" name="Oval 13">
+            <a:extLst>
+              <a:ext uri="{FF2B5EF4-FFF2-40B4-BE49-F238E27FC236}">
+                <a16:creationId xmlns:a16="http://schemas.microsoft.com/office/drawing/2014/main" id="{363A5F31-F889-2B41-83F7-3456AF709B68}"/>
+              </a:ext>
+            </a:extLst>
+          </p:cNvPr>
+          <p:cNvSpPr/>
+          <p:nvPr/>
+        </p:nvSpPr>
+        <p:spPr>
+          <a:xfrm>
+            <a:off x="8317086" y="3187619"/>
+            <a:ext cx="731531" cy="731531"/>
+          </a:xfrm>
+          <a:prstGeom prst="ellipse">
+            <a:avLst/>
+          </a:prstGeom>
+          <a:solidFill>
+            <a:schemeClr val="accent1">
+              <a:lumMod val="75000"/>
+            </a:schemeClr>
+          </a:solidFill>
+        </p:spPr>
+        <p:style>
+          <a:lnRef idx="2">
+            <a:schemeClr val="accent1">
+              <a:shade val="50000"/>
+            </a:schemeClr>
+          </a:lnRef>
+          <a:fillRef idx="1">
+            <a:schemeClr val="accent1"/>
+          </a:fillRef>
+          <a:effectRef idx="0">
+            <a:schemeClr val="accent1"/>
+          </a:effectRef>
+          <a:fontRef idx="minor">
+            <a:schemeClr val="lt1"/>
+          </a:fontRef>
+        </p:style>
+        <p:txBody>
+          <a:bodyPr rtlCol="0" anchor="ctr"/>
+          <a:lstStyle/>
+          <a:p>
+            <a:pPr algn="ctr"/>
+            <a:r>
+              <a:rPr lang="en-US" sz="1200" dirty="0"/>
+              <a:t>Cam</a:t>
+            </a:r>
+            <a:endParaRPr lang="en-US" dirty="0"/>
+          </a:p>
+        </p:txBody>
+      </p:sp>
+      <p:cxnSp>
+        <p:nvCxnSpPr>
+          <p:cNvPr id="15" name="Straight Connector 14">
+            <a:extLst>
+              <a:ext uri="{FF2B5EF4-FFF2-40B4-BE49-F238E27FC236}">
+                <a16:creationId xmlns:a16="http://schemas.microsoft.com/office/drawing/2014/main" id="{DE70149A-6CB3-C849-979F-3D622406F0FD}"/>
+              </a:ext>
+            </a:extLst>
+          </p:cNvPr>
+          <p:cNvCxnSpPr>
+            <a:cxnSpLocks/>
+            <a:endCxn id="14" idx="0"/>
+          </p:cNvCxnSpPr>
+          <p:nvPr/>
+        </p:nvCxnSpPr>
+        <p:spPr>
+          <a:xfrm>
+            <a:off x="8682852" y="2892285"/>
+            <a:ext cx="0" cy="295334"/>
+          </a:xfrm>
+          <a:prstGeom prst="line">
+            <a:avLst/>
+          </a:prstGeom>
+          <a:ln w="47625">
+            <a:solidFill>
+              <a:schemeClr val="bg2">
+                <a:lumMod val="50000"/>
+              </a:schemeClr>
+            </a:solidFill>
+          </a:ln>
+        </p:spPr>
+        <p:style>
+          <a:lnRef idx="1">
+            <a:schemeClr val="accent1"/>
+          </a:lnRef>
+          <a:fillRef idx="0">
+            <a:schemeClr val="accent1"/>
+          </a:fillRef>
+          <a:effectRef idx="0">
+            <a:schemeClr val="accent1"/>
+          </a:effectRef>
+          <a:fontRef idx="minor">
+            <a:schemeClr val="tx1"/>
+          </a:fontRef>
+        </p:style>
+      </p:cxnSp>
+      <p:cxnSp>
+        <p:nvCxnSpPr>
+          <p:cNvPr id="19" name="Straight Arrow Connector 18">
+            <a:extLst>
+              <a:ext uri="{FF2B5EF4-FFF2-40B4-BE49-F238E27FC236}">
+                <a16:creationId xmlns:a16="http://schemas.microsoft.com/office/drawing/2014/main" id="{750C491F-94D0-5441-B936-BDB18249A1CF}"/>
+              </a:ext>
+            </a:extLst>
+          </p:cNvPr>
+          <p:cNvCxnSpPr>
+            <a:cxnSpLocks/>
+          </p:cNvCxnSpPr>
+          <p:nvPr/>
+        </p:nvCxnSpPr>
+        <p:spPr>
+          <a:xfrm flipV="1">
+            <a:off x="3268634" y="2892285"/>
+            <a:ext cx="0" cy="1126434"/>
+          </a:xfrm>
+          <a:prstGeom prst="straightConnector1">
+            <a:avLst/>
+          </a:prstGeom>
+          <a:ln w="47625">
+            <a:solidFill>
+              <a:schemeClr val="tx1"/>
+            </a:solidFill>
+            <a:tailEnd type="triangle"/>
+          </a:ln>
+        </p:spPr>
+        <p:style>
+          <a:lnRef idx="1">
+            <a:schemeClr val="accent1"/>
+          </a:lnRef>
+          <a:fillRef idx="0">
+            <a:schemeClr val="accent1"/>
+          </a:fillRef>
+          <a:effectRef idx="0">
+            <a:schemeClr val="accent1"/>
+          </a:effectRef>
+          <a:fontRef idx="minor">
+            <a:schemeClr val="tx1"/>
+          </a:fontRef>
+        </p:style>
+      </p:cxnSp>
+      <p:cxnSp>
+        <p:nvCxnSpPr>
+          <p:cNvPr id="25" name="Straight Arrow Connector 24">
+            <a:extLst>
+              <a:ext uri="{FF2B5EF4-FFF2-40B4-BE49-F238E27FC236}">
+                <a16:creationId xmlns:a16="http://schemas.microsoft.com/office/drawing/2014/main" id="{1EE23567-19E5-2E4A-8251-3919C6A04221}"/>
+              </a:ext>
+            </a:extLst>
+          </p:cNvPr>
+          <p:cNvCxnSpPr>
+            <a:cxnSpLocks/>
+          </p:cNvCxnSpPr>
+          <p:nvPr/>
+        </p:nvCxnSpPr>
+        <p:spPr>
+          <a:xfrm>
+            <a:off x="4080017" y="2441397"/>
+            <a:ext cx="1194351" cy="0"/>
+          </a:xfrm>
+          <a:prstGeom prst="straightConnector1">
+            <a:avLst/>
+          </a:prstGeom>
+          <a:ln w="47625">
+            <a:solidFill>
+              <a:schemeClr val="tx1"/>
+            </a:solidFill>
+            <a:tailEnd type="triangle"/>
+          </a:ln>
+        </p:spPr>
+        <p:style>
+          <a:lnRef idx="1">
+            <a:schemeClr val="accent1"/>
+          </a:lnRef>
+          <a:fillRef idx="0">
+            <a:schemeClr val="accent1"/>
+          </a:fillRef>
+          <a:effectRef idx="0">
+            <a:schemeClr val="accent1"/>
+          </a:effectRef>
+          <a:fontRef idx="minor">
+            <a:schemeClr val="tx1"/>
+          </a:fontRef>
+        </p:style>
+      </p:cxnSp>
+      <p:sp>
+        <p:nvSpPr>
+          <p:cNvPr id="2" name="TextBox 1">
+            <a:extLst>
+              <a:ext uri="{FF2B5EF4-FFF2-40B4-BE49-F238E27FC236}">
+                <a16:creationId xmlns:a16="http://schemas.microsoft.com/office/drawing/2014/main" id="{887C7C50-6095-A946-A013-127BB318C1B1}"/>
+              </a:ext>
+            </a:extLst>
+          </p:cNvPr>
+          <p:cNvSpPr txBox="1"/>
+          <p:nvPr/>
+        </p:nvSpPr>
+        <p:spPr>
+          <a:xfrm>
+            <a:off x="904461" y="513449"/>
+            <a:ext cx="2912165" cy="461665"/>
+          </a:xfrm>
+          <a:prstGeom prst="rect">
+            <a:avLst/>
+          </a:prstGeom>
+          <a:noFill/>
+        </p:spPr>
+        <p:txBody>
+          <a:bodyPr wrap="square" rtlCol="0">
+            <a:spAutoFit/>
+          </a:bodyPr>
+          <a:lstStyle/>
+          <a:p>
+            <a:r>
+              <a:rPr lang="en-US" sz="2400" dirty="0"/>
+              <a:t>Data Flow (Demo)</a:t>
+            </a:r>
+          </a:p>
+        </p:txBody>
+      </p:sp>
+      <p:sp>
+        <p:nvSpPr>
+          <p:cNvPr id="12" name="Rectangle 11">
+            <a:extLst>
+              <a:ext uri="{FF2B5EF4-FFF2-40B4-BE49-F238E27FC236}">
+                <a16:creationId xmlns:a16="http://schemas.microsoft.com/office/drawing/2014/main" id="{25B2EA7B-9C48-C447-B238-4687E3989DE9}"/>
+              </a:ext>
+            </a:extLst>
+          </p:cNvPr>
+          <p:cNvSpPr/>
+          <p:nvPr/>
+        </p:nvSpPr>
+        <p:spPr>
+          <a:xfrm>
+            <a:off x="7786987" y="1769163"/>
+            <a:ext cx="1858618" cy="1123122"/>
+          </a:xfrm>
+          <a:prstGeom prst="rect">
+            <a:avLst/>
+          </a:prstGeom>
+          <a:solidFill>
+            <a:schemeClr val="accent6">
+              <a:lumMod val="50000"/>
+            </a:schemeClr>
+          </a:solidFill>
+          <a:ln>
+            <a:solidFill>
+              <a:schemeClr val="tx1"/>
+            </a:solidFill>
+          </a:ln>
+        </p:spPr>
+        <p:style>
+          <a:lnRef idx="2">
+            <a:schemeClr val="accent1">
+              <a:shade val="50000"/>
+            </a:schemeClr>
+          </a:lnRef>
+          <a:fillRef idx="1">
+            <a:schemeClr val="accent1"/>
+          </a:fillRef>
+          <a:effectRef idx="0">
+            <a:schemeClr val="accent1"/>
+          </a:effectRef>
+          <a:fontRef idx="minor">
+            <a:schemeClr val="lt1"/>
+          </a:fontRef>
+        </p:style>
+        <p:txBody>
+          <a:bodyPr rtlCol="0" anchor="ctr"/>
+          <a:lstStyle/>
+          <a:p>
+            <a:pPr algn="ctr"/>
+            <a:r>
+              <a:rPr lang="en-US" dirty="0"/>
+              <a:t>PC</a:t>
+            </a:r>
+          </a:p>
+        </p:txBody>
+      </p:sp>
+      <p:cxnSp>
+        <p:nvCxnSpPr>
+          <p:cNvPr id="13" name="Straight Arrow Connector 12">
+            <a:extLst>
+              <a:ext uri="{FF2B5EF4-FFF2-40B4-BE49-F238E27FC236}">
+                <a16:creationId xmlns:a16="http://schemas.microsoft.com/office/drawing/2014/main" id="{2B3878F3-AC53-C64A-83A8-116B308A8E11}"/>
+              </a:ext>
+            </a:extLst>
+          </p:cNvPr>
+          <p:cNvCxnSpPr>
+            <a:cxnSpLocks/>
+            <a:stCxn id="12" idx="1"/>
+            <a:endCxn id="7" idx="3"/>
+          </p:cNvCxnSpPr>
+          <p:nvPr/>
+        </p:nvCxnSpPr>
+        <p:spPr>
+          <a:xfrm flipH="1">
+            <a:off x="7132986" y="2330724"/>
+            <a:ext cx="654001" cy="0"/>
+          </a:xfrm>
+          <a:prstGeom prst="straightConnector1">
+            <a:avLst/>
+          </a:prstGeom>
+          <a:ln w="47625">
+            <a:solidFill>
+              <a:schemeClr val="tx1"/>
+            </a:solidFill>
+            <a:tailEnd type="triangle"/>
+          </a:ln>
+        </p:spPr>
+        <p:style>
+          <a:lnRef idx="1">
+            <a:schemeClr val="accent1"/>
+          </a:lnRef>
+          <a:fillRef idx="0">
+            <a:schemeClr val="accent1"/>
+          </a:fillRef>
+          <a:effectRef idx="0">
+            <a:schemeClr val="accent1"/>
+          </a:effectRef>
+          <a:fontRef idx="minor">
+            <a:schemeClr val="tx1"/>
+          </a:fontRef>
+        </p:style>
+      </p:cxnSp>
+    </p:spTree>
+    <p:extLst>
+      <p:ext uri="{BB962C8B-B14F-4D97-AF65-F5344CB8AC3E}">
+        <p14:creationId xmlns:p14="http://schemas.microsoft.com/office/powerpoint/2010/main" val="387546581"/>
+      </p:ext>
+    </p:extLst>
+  </p:cSld>
+  <p:clrMapOvr>
+    <a:masterClrMapping/>
+  </p:clrMapOvr>
+</p:sld>
+</file>
+
+<file path=ppt/slides/slide4.xml><?xml version="1.0" encoding="utf-8"?>
 <p:sld xmlns:a="http://schemas.openxmlformats.org/drawingml/2006/main" xmlns:r="http://schemas.openxmlformats.org/officeDocument/2006/relationships" xmlns:p="http://schemas.openxmlformats.org/presentationml/2006/main">
   <p:cSld>
     <p:spTree>

</xml_diff>